<commit_message>
Update mv stage 1 presentation
</commit_message>
<xml_diff>
--- a/Lectures/Day3_4lecture_McDonaldValley_Stage1.pptx
+++ b/Lectures/Day3_4lecture_McDonaldValley_Stage1.pptx
@@ -5,10 +5,10 @@
     <p:sldMasterId id="2147483648" r:id="rId1"/>
   </p:sldMasterIdLst>
   <p:notesMasterIdLst>
-    <p:notesMasterId r:id="rId15"/>
+    <p:notesMasterId r:id="rId18"/>
   </p:notesMasterIdLst>
   <p:handoutMasterIdLst>
-    <p:handoutMasterId r:id="rId16"/>
+    <p:handoutMasterId r:id="rId19"/>
   </p:handoutMasterIdLst>
   <p:sldIdLst>
     <p:sldId id="587" r:id="rId2"/>
@@ -23,7 +23,10 @@
     <p:sldId id="597" r:id="rId11"/>
     <p:sldId id="598" r:id="rId12"/>
     <p:sldId id="599" r:id="rId13"/>
-    <p:sldId id="600" r:id="rId14"/>
+    <p:sldId id="601" r:id="rId14"/>
+    <p:sldId id="602" r:id="rId15"/>
+    <p:sldId id="603" r:id="rId16"/>
+    <p:sldId id="600" r:id="rId17"/>
   </p:sldIdLst>
   <p:sldSz cx="12192000" cy="6858000"/>
   <p:notesSz cx="6950075" cy="9236075"/>
@@ -2601,14 +2604,14 @@
           <a:effectLst/>
           <a:extLst>
             <a:ext uri="{909E8E84-426E-40dd-AFC4-6F175D3DCCD1}">
-              <a14:hiddenFill xmlns:a14="http://schemas.microsoft.com/office/drawing/2010/main" xmlns="">
+              <a14:hiddenFill xmlns="" xmlns:a14="http://schemas.microsoft.com/office/drawing/2010/main">
                 <a:solidFill>
                   <a:schemeClr val="accent1"/>
                 </a:solidFill>
               </a14:hiddenFill>
             </a:ext>
             <a:ext uri="{91240B29-F687-4f45-9708-019B960494DF}">
-              <a14:hiddenLine xmlns:a14="http://schemas.microsoft.com/office/drawing/2010/main" xmlns="" w="12700">
+              <a14:hiddenLine xmlns="" xmlns:a14="http://schemas.microsoft.com/office/drawing/2010/main" w="12700">
                 <a:solidFill>
                   <a:schemeClr val="tx1"/>
                 </a:solidFill>
@@ -2618,7 +2621,7 @@
               </a14:hiddenLine>
             </a:ext>
             <a:ext uri="{AF507438-7753-43e0-B8FC-AC1667EBCBE1}">
-              <a14:hiddenEffects xmlns:a14="http://schemas.microsoft.com/office/drawing/2010/main" xmlns="">
+              <a14:hiddenEffects xmlns="" xmlns:a14="http://schemas.microsoft.com/office/drawing/2010/main">
                 <a:effectLst>
                   <a:outerShdw blurRad="63500" dist="38099" dir="2700000" algn="ctr" rotWithShape="0">
                     <a:schemeClr val="bg2">
@@ -2629,7 +2632,7 @@
               </a14:hiddenEffects>
             </a:ext>
             <a:ext uri="{FAA26D3D-D897-4be2-8F04-BA451C77F1D7}">
-              <ma14:placeholderFlag xmlns:ma14="http://schemas.microsoft.com/office/mac/drawingml/2011/main" xmlns="" val="1"/>
+              <ma14:placeholderFlag xmlns="" xmlns:ma14="http://schemas.microsoft.com/office/mac/drawingml/2011/main" val="1"/>
             </a:ext>
           </a:extLst>
         </p:spPr>
@@ -2707,12 +2710,12 @@
           <a:effectLst/>
           <a:extLst>
             <a:ext uri="{909E8E84-426E-40dd-AFC4-6F175D3DCCD1}">
-              <a14:hiddenFill xmlns:a14="http://schemas.microsoft.com/office/drawing/2010/main" xmlns="">
+              <a14:hiddenFill xmlns="" xmlns:a14="http://schemas.microsoft.com/office/drawing/2010/main">
                 <a:noFill/>
               </a14:hiddenFill>
             </a:ext>
             <a:ext uri="{AF507438-7753-43e0-B8FC-AC1667EBCBE1}">
-              <a14:hiddenEffects xmlns:a14="http://schemas.microsoft.com/office/drawing/2010/main" xmlns="">
+              <a14:hiddenEffects xmlns="" xmlns:a14="http://schemas.microsoft.com/office/drawing/2010/main">
                 <a:effectLst>
                   <a:outerShdw blurRad="63500" dist="38099" dir="2700000" algn="ctr" rotWithShape="0">
                     <a:srgbClr val="000000">
@@ -2723,7 +2726,7 @@
               </a14:hiddenEffects>
             </a:ext>
             <a:ext uri="{53640926-AAD7-44d8-BBD7-CCE9431645EC}">
-              <a14:shadowObscured xmlns:a14="http://schemas.microsoft.com/office/drawing/2010/main" xmlns="" val="1"/>
+              <a14:shadowObscured xmlns="" xmlns:a14="http://schemas.microsoft.com/office/drawing/2010/main" val="1"/>
             </a:ext>
           </a:extLst>
         </p:spPr>
@@ -2901,14 +2904,14 @@
           <a:effectLst/>
           <a:extLst>
             <a:ext uri="{909E8E84-426E-40dd-AFC4-6F175D3DCCD1}">
-              <a14:hiddenFill xmlns="" xmlns:a14="http://schemas.microsoft.com/office/drawing/2010/main">
+              <a14:hiddenFill xmlns:a14="http://schemas.microsoft.com/office/drawing/2010/main" xmlns="">
                 <a:solidFill>
                   <a:schemeClr val="accent1"/>
                 </a:solidFill>
               </a14:hiddenFill>
             </a:ext>
             <a:ext uri="{91240B29-F687-4f45-9708-019B960494DF}">
-              <a14:hiddenLine xmlns="" xmlns:a14="http://schemas.microsoft.com/office/drawing/2010/main" w="12700">
+              <a14:hiddenLine xmlns:a14="http://schemas.microsoft.com/office/drawing/2010/main" xmlns="" w="12700">
                 <a:solidFill>
                   <a:schemeClr val="tx1"/>
                 </a:solidFill>
@@ -2918,7 +2921,7 @@
               </a14:hiddenLine>
             </a:ext>
             <a:ext uri="{AF507438-7753-43e0-B8FC-AC1667EBCBE1}">
-              <a14:hiddenEffects xmlns="" xmlns:a14="http://schemas.microsoft.com/office/drawing/2010/main">
+              <a14:hiddenEffects xmlns:a14="http://schemas.microsoft.com/office/drawing/2010/main" xmlns="">
                 <a:effectLst>
                   <a:outerShdw blurRad="63500" dist="38099" dir="2700000" algn="ctr" rotWithShape="0">
                     <a:schemeClr val="bg2">
@@ -3073,14 +3076,14 @@
           </a:ln>
           <a:extLst>
             <a:ext uri="{909E8E84-426E-40dd-AFC4-6F175D3DCCD1}">
-              <a14:hiddenFill xmlns="" xmlns:a14="http://schemas.microsoft.com/office/drawing/2010/main">
+              <a14:hiddenFill xmlns:a14="http://schemas.microsoft.com/office/drawing/2010/main" xmlns="">
                 <a:solidFill>
                   <a:srgbClr val="FFFFFF"/>
                 </a:solidFill>
               </a14:hiddenFill>
             </a:ext>
             <a:ext uri="{91240B29-F687-4f45-9708-019B960494DF}">
-              <a14:hiddenLine xmlns="" xmlns:a14="http://schemas.microsoft.com/office/drawing/2010/main" w="9525">
+              <a14:hiddenLine xmlns:a14="http://schemas.microsoft.com/office/drawing/2010/main" xmlns="" w="9525">
                 <a:solidFill>
                   <a:srgbClr val="000000"/>
                 </a:solidFill>
@@ -4659,14 +4662,14 @@
           <a:effectLst/>
           <a:extLst>
             <a:ext uri="{909E8E84-426E-40dd-AFC4-6F175D3DCCD1}">
-              <a14:hiddenFill xmlns="" xmlns:a14="http://schemas.microsoft.com/office/drawing/2010/main">
+              <a14:hiddenFill xmlns:a14="http://schemas.microsoft.com/office/drawing/2010/main" xmlns="">
                 <a:solidFill>
                   <a:schemeClr val="accent1"/>
                 </a:solidFill>
               </a14:hiddenFill>
             </a:ext>
             <a:ext uri="{91240B29-F687-4f45-9708-019B960494DF}">
-              <a14:hiddenLine xmlns="" xmlns:a14="http://schemas.microsoft.com/office/drawing/2010/main" w="12700">
+              <a14:hiddenLine xmlns:a14="http://schemas.microsoft.com/office/drawing/2010/main" xmlns="" w="12700">
                 <a:solidFill>
                   <a:schemeClr val="tx1"/>
                 </a:solidFill>
@@ -4676,7 +4679,7 @@
               </a14:hiddenLine>
             </a:ext>
             <a:ext uri="{AF507438-7753-43e0-B8FC-AC1667EBCBE1}">
-              <a14:hiddenEffects xmlns="" xmlns:a14="http://schemas.microsoft.com/office/drawing/2010/main">
+              <a14:hiddenEffects xmlns:a14="http://schemas.microsoft.com/office/drawing/2010/main" xmlns="">
                 <a:effectLst>
                   <a:outerShdw blurRad="63500" dist="38099" dir="2700000" algn="ctr" rotWithShape="0">
                     <a:schemeClr val="bg2">
@@ -4687,7 +4690,7 @@
               </a14:hiddenEffects>
             </a:ext>
             <a:ext uri="{FAA26D3D-D897-4be2-8F04-BA451C77F1D7}">
-              <ma14:placeholderFlag xmlns="" xmlns:ma14="http://schemas.microsoft.com/office/mac/drawingml/2011/main" val="1"/>
+              <ma14:placeholderFlag xmlns:ma14="http://schemas.microsoft.com/office/mac/drawingml/2011/main" xmlns="" val="1"/>
             </a:ext>
           </a:extLst>
         </p:spPr>
@@ -4732,14 +4735,14 @@
           <a:effectLst/>
           <a:extLst>
             <a:ext uri="{909E8E84-426E-40dd-AFC4-6F175D3DCCD1}">
-              <a14:hiddenFill xmlns="" xmlns:a14="http://schemas.microsoft.com/office/drawing/2010/main">
+              <a14:hiddenFill xmlns:a14="http://schemas.microsoft.com/office/drawing/2010/main" xmlns="">
                 <a:solidFill>
                   <a:schemeClr val="accent1"/>
                 </a:solidFill>
               </a14:hiddenFill>
             </a:ext>
             <a:ext uri="{91240B29-F687-4f45-9708-019B960494DF}">
-              <a14:hiddenLine xmlns="" xmlns:a14="http://schemas.microsoft.com/office/drawing/2010/main" w="12700">
+              <a14:hiddenLine xmlns:a14="http://schemas.microsoft.com/office/drawing/2010/main" xmlns="" w="12700">
                 <a:solidFill>
                   <a:schemeClr val="tx1"/>
                 </a:solidFill>
@@ -4749,7 +4752,7 @@
               </a14:hiddenLine>
             </a:ext>
             <a:ext uri="{AF507438-7753-43e0-B8FC-AC1667EBCBE1}">
-              <a14:hiddenEffects xmlns="" xmlns:a14="http://schemas.microsoft.com/office/drawing/2010/main">
+              <a14:hiddenEffects xmlns:a14="http://schemas.microsoft.com/office/drawing/2010/main" xmlns="">
                 <a:effectLst>
                   <a:outerShdw blurRad="63500" dist="38099" dir="2700000" algn="ctr" rotWithShape="0">
                     <a:schemeClr val="bg2">
@@ -4760,7 +4763,7 @@
               </a14:hiddenEffects>
             </a:ext>
             <a:ext uri="{FAA26D3D-D897-4be2-8F04-BA451C77F1D7}">
-              <ma14:placeholderFlag xmlns="" xmlns:ma14="http://schemas.microsoft.com/office/mac/drawingml/2011/main" val="1"/>
+              <ma14:placeholderFlag xmlns:ma14="http://schemas.microsoft.com/office/mac/drawingml/2011/main" xmlns="" val="1"/>
             </a:ext>
           </a:extLst>
         </p:spPr>
@@ -4850,14 +4853,14 @@
           </a:ln>
           <a:extLst>
             <a:ext uri="{909E8E84-426E-40dd-AFC4-6F175D3DCCD1}">
-              <a14:hiddenFill xmlns="" xmlns:a14="http://schemas.microsoft.com/office/drawing/2010/main">
+              <a14:hiddenFill xmlns:a14="http://schemas.microsoft.com/office/drawing/2010/main" xmlns="">
                 <a:solidFill>
                   <a:srgbClr val="FFFFFF"/>
                 </a:solidFill>
               </a14:hiddenFill>
             </a:ext>
             <a:ext uri="{91240B29-F687-4f45-9708-019B960494DF}">
-              <a14:hiddenLine xmlns="" xmlns:a14="http://schemas.microsoft.com/office/drawing/2010/main" w="9525">
+              <a14:hiddenLine xmlns:a14="http://schemas.microsoft.com/office/drawing/2010/main" xmlns="" w="9525">
                 <a:solidFill>
                   <a:srgbClr val="000000"/>
                 </a:solidFill>
@@ -8867,6 +8870,1001 @@
 </file>
 
 <file path=ppt/slides/slide13.xml><?xml version="1.0" encoding="utf-8"?>
+<p:sld xmlns:a="http://schemas.openxmlformats.org/drawingml/2006/main" xmlns:r="http://schemas.openxmlformats.org/officeDocument/2006/relationships" xmlns:p="http://schemas.openxmlformats.org/presentationml/2006/main">
+  <p:cSld>
+    <p:spTree>
+      <p:nvGrpSpPr>
+        <p:cNvPr id="1" name=""/>
+        <p:cNvGrpSpPr/>
+        <p:nvPr/>
+      </p:nvGrpSpPr>
+      <p:grpSpPr>
+        <a:xfrm>
+          <a:off x="0" y="0"/>
+          <a:ext cx="0" cy="0"/>
+          <a:chOff x="0" y="0"/>
+          <a:chExt cx="0" cy="0"/>
+        </a:xfrm>
+      </p:grpSpPr>
+      <p:sp>
+        <p:nvSpPr>
+          <p:cNvPr id="2" name="Title 1">
+            <a:extLst>
+              <a:ext uri="{FF2B5EF4-FFF2-40B4-BE49-F238E27FC236}">
+                <a16:creationId xmlns:a16="http://schemas.microsoft.com/office/drawing/2014/main" id="{6EFA02C5-6826-BA69-6102-8C926635E2A9}"/>
+              </a:ext>
+            </a:extLst>
+          </p:cNvPr>
+          <p:cNvSpPr>
+            <a:spLocks noGrp="1"/>
+          </p:cNvSpPr>
+          <p:nvPr>
+            <p:ph type="title"/>
+          </p:nvPr>
+        </p:nvSpPr>
+        <p:spPr/>
+        <p:txBody>
+          <a:bodyPr/>
+          <a:lstStyle/>
+          <a:p>
+            <a:r>
+              <a:rPr lang="en-US" dirty="0"/>
+              <a:t>Stage 1 – Planning Phase</a:t>
+            </a:r>
+          </a:p>
+        </p:txBody>
+      </p:sp>
+      <p:sp>
+        <p:nvSpPr>
+          <p:cNvPr id="3" name="Content Placeholder 2">
+            <a:extLst>
+              <a:ext uri="{FF2B5EF4-FFF2-40B4-BE49-F238E27FC236}">
+                <a16:creationId xmlns:a16="http://schemas.microsoft.com/office/drawing/2014/main" id="{6874B491-DBE8-FB12-10E6-A09E4683949C}"/>
+              </a:ext>
+            </a:extLst>
+          </p:cNvPr>
+          <p:cNvSpPr>
+            <a:spLocks noGrp="1"/>
+          </p:cNvSpPr>
+          <p:nvPr>
+            <p:ph idx="1"/>
+          </p:nvPr>
+        </p:nvSpPr>
+        <p:spPr/>
+        <p:txBody>
+          <a:bodyPr/>
+          <a:lstStyle/>
+          <a:p>
+            <a:pPr marL="0" indent="0">
+              <a:buNone/>
+            </a:pPr>
+            <a:r>
+              <a:rPr lang="en-US" dirty="0"/>
+              <a:t>Net groundwater recharge</a:t>
+            </a:r>
+          </a:p>
+          <a:p>
+            <a:r>
+              <a:rPr lang="en-US" dirty="0"/>
+              <a:t>Downstream flow = net groundwater recharge </a:t>
+            </a:r>
+          </a:p>
+          <a:p>
+            <a:r>
+              <a:rPr lang="en-US" dirty="0"/>
+              <a:t>Net groundwater recharge (</a:t>
+            </a:r>
+            <a:r>
+              <a:rPr lang="en-US" dirty="0" err="1"/>
+              <a:t>I</a:t>
+            </a:r>
+            <a:r>
+              <a:rPr lang="en-US" baseline="-25000" dirty="0" err="1"/>
+              <a:t>total</a:t>
+            </a:r>
+            <a:r>
+              <a:rPr lang="en-US" dirty="0"/>
+              <a:t>) = 888,494 ft</a:t>
+            </a:r>
+            <a:r>
+              <a:rPr lang="en-US" baseline="30000" dirty="0"/>
+              <a:t>3</a:t>
+            </a:r>
+            <a:r>
+              <a:rPr lang="en-US" dirty="0"/>
+              <a:t>/d</a:t>
+            </a:r>
+          </a:p>
+          <a:p>
+            <a:pPr lvl="1"/>
+            <a:r>
+              <a:rPr lang="en-US" dirty="0" err="1"/>
+              <a:t>I</a:t>
+            </a:r>
+            <a:r>
+              <a:rPr lang="en-US" baseline="-25000" dirty="0" err="1"/>
+              <a:t>total</a:t>
+            </a:r>
+            <a:r>
+              <a:rPr lang="en-US" dirty="0"/>
+              <a:t> = </a:t>
+            </a:r>
+            <a:r>
+              <a:rPr lang="en-US" dirty="0" err="1"/>
+              <a:t>I</a:t>
+            </a:r>
+            <a:r>
+              <a:rPr lang="en-US" baseline="-25000" dirty="0" err="1"/>
+              <a:t>lake</a:t>
+            </a:r>
+            <a:r>
+              <a:rPr lang="en-US" dirty="0"/>
+              <a:t> + </a:t>
+            </a:r>
+            <a:r>
+              <a:rPr lang="en-US" dirty="0" err="1"/>
+              <a:t>I</a:t>
+            </a:r>
+            <a:r>
+              <a:rPr lang="en-US" baseline="-25000" dirty="0" err="1"/>
+              <a:t>land</a:t>
+            </a:r>
+            <a:r>
+              <a:rPr lang="en-US" dirty="0"/>
+              <a:t> </a:t>
+            </a:r>
+          </a:p>
+          <a:p>
+            <a:r>
+              <a:rPr lang="en-US" dirty="0"/>
+              <a:t>Water budget</a:t>
+            </a:r>
+          </a:p>
+          <a:p>
+            <a:pPr lvl="1"/>
+            <a:r>
+              <a:rPr lang="en-US" dirty="0" err="1"/>
+              <a:t>Q</a:t>
+            </a:r>
+            <a:r>
+              <a:rPr lang="en-US" baseline="-25000" dirty="0" err="1"/>
+              <a:t>ds</a:t>
+            </a:r>
+            <a:r>
+              <a:rPr lang="en-US" dirty="0"/>
+              <a:t> = </a:t>
+            </a:r>
+            <a:r>
+              <a:rPr lang="en-US" dirty="0" err="1"/>
+              <a:t>Q</a:t>
+            </a:r>
+            <a:r>
+              <a:rPr lang="en-US" baseline="-25000" dirty="0" err="1"/>
+              <a:t>lake</a:t>
+            </a:r>
+            <a:r>
+              <a:rPr lang="en-US" dirty="0"/>
+              <a:t> + </a:t>
+            </a:r>
+            <a:r>
+              <a:rPr lang="en-US" dirty="0" err="1"/>
+              <a:t>Q</a:t>
+            </a:r>
+            <a:r>
+              <a:rPr lang="en-US" baseline="-25000" dirty="0" err="1"/>
+              <a:t>land</a:t>
+            </a:r>
+            <a:endParaRPr lang="en-US" dirty="0"/>
+          </a:p>
+          <a:p>
+            <a:pPr lvl="1"/>
+            <a:r>
+              <a:rPr lang="en-US" dirty="0" err="1"/>
+              <a:t>Q</a:t>
+            </a:r>
+            <a:r>
+              <a:rPr lang="en-US" baseline="-25000" dirty="0" err="1"/>
+              <a:t>lake</a:t>
+            </a:r>
+            <a:r>
+              <a:rPr lang="en-US" dirty="0"/>
+              <a:t> = A</a:t>
+            </a:r>
+            <a:r>
+              <a:rPr lang="en-US" baseline="-25000" dirty="0"/>
+              <a:t>lake</a:t>
+            </a:r>
+            <a:r>
+              <a:rPr lang="en-US" dirty="0"/>
+              <a:t> </a:t>
+            </a:r>
+            <a:r>
+              <a:rPr lang="en-US" dirty="0" err="1"/>
+              <a:t>I</a:t>
+            </a:r>
+            <a:r>
+              <a:rPr lang="en-US" baseline="-25000" dirty="0" err="1"/>
+              <a:t>lake</a:t>
+            </a:r>
+            <a:r>
+              <a:rPr lang="en-US" dirty="0"/>
+              <a:t> = A</a:t>
+            </a:r>
+            <a:r>
+              <a:rPr lang="en-US" baseline="-25000" dirty="0"/>
+              <a:t>lake</a:t>
+            </a:r>
+            <a:r>
+              <a:rPr lang="en-US" dirty="0"/>
+              <a:t> (</a:t>
+            </a:r>
+            <a:r>
+              <a:rPr lang="en-US" dirty="0" err="1"/>
+              <a:t>R</a:t>
+            </a:r>
+            <a:r>
+              <a:rPr lang="en-US" baseline="-25000" dirty="0" err="1"/>
+              <a:t>lake</a:t>
+            </a:r>
+            <a:r>
+              <a:rPr lang="en-US" dirty="0"/>
+              <a:t> – </a:t>
+            </a:r>
+            <a:r>
+              <a:rPr lang="en-US" dirty="0" err="1"/>
+              <a:t>E</a:t>
+            </a:r>
+            <a:r>
+              <a:rPr lang="en-US" baseline="-25000" dirty="0" err="1"/>
+              <a:t>lake</a:t>
+            </a:r>
+            <a:r>
+              <a:rPr lang="en-US" dirty="0"/>
+              <a:t>) = A</a:t>
+            </a:r>
+            <a:r>
+              <a:rPr lang="en-US" baseline="-25000" dirty="0"/>
+              <a:t>lake</a:t>
+            </a:r>
+            <a:r>
+              <a:rPr lang="en-US" dirty="0"/>
+              <a:t> (36 in/y – 27 in/y) =  9 A</a:t>
+            </a:r>
+            <a:r>
+              <a:rPr lang="en-US" baseline="-25000" dirty="0"/>
+              <a:t>lake</a:t>
+            </a:r>
+            <a:endParaRPr lang="en-US" dirty="0"/>
+          </a:p>
+          <a:p>
+            <a:pPr lvl="1"/>
+            <a:r>
+              <a:rPr lang="en-US" dirty="0" err="1"/>
+              <a:t>Q</a:t>
+            </a:r>
+            <a:r>
+              <a:rPr lang="en-US" baseline="-25000" dirty="0" err="1"/>
+              <a:t>land</a:t>
+            </a:r>
+            <a:r>
+              <a:rPr lang="en-US" dirty="0"/>
+              <a:t> = A</a:t>
+            </a:r>
+            <a:r>
+              <a:rPr lang="en-US" baseline="-25000" dirty="0"/>
+              <a:t>land</a:t>
+            </a:r>
+            <a:r>
+              <a:rPr lang="en-US" dirty="0"/>
+              <a:t> </a:t>
+            </a:r>
+            <a:r>
+              <a:rPr lang="en-US" dirty="0" err="1"/>
+              <a:t>I</a:t>
+            </a:r>
+            <a:r>
+              <a:rPr lang="en-US" baseline="-25000" dirty="0" err="1"/>
+              <a:t>land</a:t>
+            </a:r>
+            <a:r>
+              <a:rPr lang="en-US" dirty="0"/>
+              <a:t> = A</a:t>
+            </a:r>
+            <a:r>
+              <a:rPr lang="en-US" baseline="-25000" dirty="0"/>
+              <a:t>land</a:t>
+            </a:r>
+            <a:r>
+              <a:rPr lang="en-US" dirty="0"/>
+              <a:t> (</a:t>
+            </a:r>
+            <a:r>
+              <a:rPr lang="en-US" dirty="0" err="1"/>
+              <a:t>R</a:t>
+            </a:r>
+            <a:r>
+              <a:rPr lang="en-US" baseline="-25000" dirty="0" err="1"/>
+              <a:t>land</a:t>
+            </a:r>
+            <a:r>
+              <a:rPr lang="en-US" dirty="0"/>
+              <a:t> – </a:t>
+            </a:r>
+            <a:r>
+              <a:rPr lang="en-US" dirty="0" err="1"/>
+              <a:t>ET</a:t>
+            </a:r>
+            <a:r>
+              <a:rPr lang="en-US" baseline="-25000" dirty="0" err="1"/>
+              <a:t>land</a:t>
+            </a:r>
+            <a:r>
+              <a:rPr lang="en-US" dirty="0"/>
+              <a:t>) = A</a:t>
+            </a:r>
+            <a:r>
+              <a:rPr lang="en-US" baseline="-25000" dirty="0"/>
+              <a:t>land</a:t>
+            </a:r>
+            <a:r>
+              <a:rPr lang="en-US" dirty="0"/>
+              <a:t> (36 in/y – </a:t>
+            </a:r>
+            <a:r>
+              <a:rPr lang="en-US" dirty="0" err="1"/>
+              <a:t>ET</a:t>
+            </a:r>
+            <a:r>
+              <a:rPr lang="en-US" baseline="-25000" dirty="0" err="1"/>
+              <a:t>land</a:t>
+            </a:r>
+            <a:r>
+              <a:rPr lang="en-US" dirty="0"/>
+              <a:t>) </a:t>
+            </a:r>
+          </a:p>
+          <a:p>
+            <a:r>
+              <a:rPr lang="en-US" dirty="0"/>
+              <a:t>Simplify</a:t>
+            </a:r>
+          </a:p>
+          <a:p>
+            <a:pPr lvl="1"/>
+            <a:r>
+              <a:rPr lang="en-US" dirty="0" err="1"/>
+              <a:t>ET</a:t>
+            </a:r>
+            <a:r>
+              <a:rPr lang="en-US" baseline="-25000" dirty="0" err="1"/>
+              <a:t>land</a:t>
+            </a:r>
+            <a:r>
+              <a:rPr lang="en-US" dirty="0"/>
+              <a:t> = ( 9 A</a:t>
+            </a:r>
+            <a:r>
+              <a:rPr lang="en-US" baseline="-25000" dirty="0"/>
+              <a:t>lake</a:t>
+            </a:r>
+            <a:r>
+              <a:rPr lang="en-US" dirty="0"/>
+              <a:t> + 36 A</a:t>
+            </a:r>
+            <a:r>
+              <a:rPr lang="en-US" baseline="-25000" dirty="0"/>
+              <a:t>land</a:t>
+            </a:r>
+            <a:r>
+              <a:rPr lang="en-US" dirty="0"/>
+              <a:t> – </a:t>
+            </a:r>
+            <a:r>
+              <a:rPr lang="en-US" dirty="0" err="1"/>
+              <a:t>Q</a:t>
+            </a:r>
+            <a:r>
+              <a:rPr lang="en-US" baseline="-25000" dirty="0" err="1"/>
+              <a:t>ds</a:t>
+            </a:r>
+            <a:r>
+              <a:rPr lang="en-US" dirty="0"/>
+              <a:t> ) / A</a:t>
+            </a:r>
+            <a:r>
+              <a:rPr lang="en-US" baseline="-25000" dirty="0"/>
+              <a:t>land</a:t>
+            </a:r>
+          </a:p>
+          <a:p>
+            <a:pPr lvl="1"/>
+            <a:endParaRPr lang="en-US" dirty="0"/>
+          </a:p>
+          <a:p>
+            <a:endParaRPr lang="en-US" dirty="0"/>
+          </a:p>
+        </p:txBody>
+      </p:sp>
+      <p:pic>
+        <p:nvPicPr>
+          <p:cNvPr id="6" name="Picture 5">
+            <a:extLst>
+              <a:ext uri="{FF2B5EF4-FFF2-40B4-BE49-F238E27FC236}">
+                <a16:creationId xmlns:a16="http://schemas.microsoft.com/office/drawing/2014/main" id="{5723CFAD-02FF-795F-9292-A3D569F21654}"/>
+              </a:ext>
+            </a:extLst>
+          </p:cNvPr>
+          <p:cNvPicPr>
+            <a:picLocks noChangeAspect="1"/>
+          </p:cNvPicPr>
+          <p:nvPr/>
+        </p:nvPicPr>
+        <p:blipFill rotWithShape="1">
+          <a:blip r:embed="rId2" cstate="print">
+            <a:extLst>
+              <a:ext uri="{28A0092B-C50C-407E-A947-70E740481C1C}">
+                <a14:useLocalDpi xmlns:a14="http://schemas.microsoft.com/office/drawing/2010/main" val="0"/>
+              </a:ext>
+            </a:extLst>
+          </a:blip>
+          <a:srcRect l="21235" t="10064" r="22625" b="26593"/>
+          <a:stretch/>
+        </p:blipFill>
+        <p:spPr>
+          <a:xfrm rot="-60000">
+            <a:off x="9801379" y="162860"/>
+            <a:ext cx="2225328" cy="3256313"/>
+          </a:xfrm>
+          <a:prstGeom prst="rect">
+            <a:avLst/>
+          </a:prstGeom>
+        </p:spPr>
+      </p:pic>
+    </p:spTree>
+    <p:extLst>
+      <p:ext uri="{BB962C8B-B14F-4D97-AF65-F5344CB8AC3E}">
+        <p14:creationId xmlns:p14="http://schemas.microsoft.com/office/powerpoint/2010/main" val="4082518722"/>
+      </p:ext>
+    </p:extLst>
+  </p:cSld>
+  <p:clrMapOvr>
+    <a:masterClrMapping/>
+  </p:clrMapOvr>
+</p:sld>
+</file>
+
+<file path=ppt/slides/slide14.xml><?xml version="1.0" encoding="utf-8"?>
+<p:sld xmlns:a="http://schemas.openxmlformats.org/drawingml/2006/main" xmlns:r="http://schemas.openxmlformats.org/officeDocument/2006/relationships" xmlns:p="http://schemas.openxmlformats.org/presentationml/2006/main">
+  <p:cSld>
+    <p:spTree>
+      <p:nvGrpSpPr>
+        <p:cNvPr id="1" name=""/>
+        <p:cNvGrpSpPr/>
+        <p:nvPr/>
+      </p:nvGrpSpPr>
+      <p:grpSpPr>
+        <a:xfrm>
+          <a:off x="0" y="0"/>
+          <a:ext cx="0" cy="0"/>
+          <a:chOff x="0" y="0"/>
+          <a:chExt cx="0" cy="0"/>
+        </a:xfrm>
+      </p:grpSpPr>
+      <p:sp>
+        <p:nvSpPr>
+          <p:cNvPr id="2" name="Title 1">
+            <a:extLst>
+              <a:ext uri="{FF2B5EF4-FFF2-40B4-BE49-F238E27FC236}">
+                <a16:creationId xmlns:a16="http://schemas.microsoft.com/office/drawing/2014/main" id="{6EFA02C5-6826-BA69-6102-8C926635E2A9}"/>
+              </a:ext>
+            </a:extLst>
+          </p:cNvPr>
+          <p:cNvSpPr>
+            <a:spLocks noGrp="1"/>
+          </p:cNvSpPr>
+          <p:nvPr>
+            <p:ph type="title"/>
+          </p:nvPr>
+        </p:nvSpPr>
+        <p:spPr/>
+        <p:txBody>
+          <a:bodyPr/>
+          <a:lstStyle/>
+          <a:p>
+            <a:r>
+              <a:rPr lang="en-US" dirty="0"/>
+              <a:t>Stage 1 – Planning Phase</a:t>
+            </a:r>
+          </a:p>
+        </p:txBody>
+      </p:sp>
+      <p:sp>
+        <p:nvSpPr>
+          <p:cNvPr id="3" name="Content Placeholder 2">
+            <a:extLst>
+              <a:ext uri="{FF2B5EF4-FFF2-40B4-BE49-F238E27FC236}">
+                <a16:creationId xmlns:a16="http://schemas.microsoft.com/office/drawing/2014/main" id="{6874B491-DBE8-FB12-10E6-A09E4683949C}"/>
+              </a:ext>
+            </a:extLst>
+          </p:cNvPr>
+          <p:cNvSpPr>
+            <a:spLocks noGrp="1"/>
+          </p:cNvSpPr>
+          <p:nvPr>
+            <p:ph idx="1"/>
+          </p:nvPr>
+        </p:nvSpPr>
+        <p:spPr/>
+        <p:txBody>
+          <a:bodyPr/>
+          <a:lstStyle/>
+          <a:p>
+            <a:pPr marL="0" indent="0">
+              <a:buNone/>
+            </a:pPr>
+            <a:r>
+              <a:rPr lang="en-US" dirty="0"/>
+              <a:t>Net groundwater recharge – cont.</a:t>
+            </a:r>
+          </a:p>
+          <a:p>
+            <a:r>
+              <a:rPr lang="en-US" dirty="0"/>
+              <a:t>Unit conversion (convert to feet and days)</a:t>
+            </a:r>
+          </a:p>
+          <a:p>
+            <a:pPr lvl="1"/>
+            <a:r>
+              <a:rPr lang="en-US" dirty="0" err="1"/>
+              <a:t>ET</a:t>
+            </a:r>
+            <a:r>
+              <a:rPr lang="en-US" baseline="-25000" dirty="0" err="1"/>
+              <a:t>land</a:t>
+            </a:r>
+            <a:r>
+              <a:rPr lang="en-US" dirty="0"/>
+              <a:t> = ( 0.0021 A</a:t>
+            </a:r>
+            <a:r>
+              <a:rPr lang="en-US" baseline="-25000" dirty="0"/>
+              <a:t>lake</a:t>
+            </a:r>
+            <a:r>
+              <a:rPr lang="en-US" dirty="0"/>
+              <a:t> + 0.0082 A</a:t>
+            </a:r>
+            <a:r>
+              <a:rPr lang="en-US" baseline="-25000" dirty="0"/>
+              <a:t>land</a:t>
+            </a:r>
+            <a:r>
+              <a:rPr lang="en-US" dirty="0"/>
+              <a:t> – 888,494 ) / A</a:t>
+            </a:r>
+            <a:r>
+              <a:rPr lang="en-US" baseline="-25000" dirty="0"/>
+              <a:t>land</a:t>
+            </a:r>
+          </a:p>
+          <a:p>
+            <a:endParaRPr lang="en-US" dirty="0"/>
+          </a:p>
+          <a:p>
+            <a:r>
+              <a:rPr lang="en-US" dirty="0"/>
+              <a:t>Horizontal areas</a:t>
+            </a:r>
+          </a:p>
+          <a:p>
+            <a:pPr lvl="1"/>
+            <a:r>
+              <a:rPr lang="en-US" dirty="0" err="1"/>
+              <a:t>A</a:t>
+            </a:r>
+            <a:r>
+              <a:rPr lang="en-US" baseline="-25000" dirty="0" err="1"/>
+              <a:t>total</a:t>
+            </a:r>
+            <a:r>
+              <a:rPr lang="en-US" dirty="0"/>
+              <a:t> = 500 ft x 500 ft x 40 x 25 = 250,000,000 ft</a:t>
+            </a:r>
+            <a:r>
+              <a:rPr lang="en-US" baseline="30000" dirty="0"/>
+              <a:t>2</a:t>
+            </a:r>
+          </a:p>
+          <a:p>
+            <a:pPr lvl="1"/>
+            <a:r>
+              <a:rPr lang="en-US" dirty="0"/>
+              <a:t>A</a:t>
+            </a:r>
+            <a:r>
+              <a:rPr lang="en-US" baseline="-25000" dirty="0"/>
+              <a:t>lake</a:t>
+            </a:r>
+            <a:r>
+              <a:rPr lang="en-US" dirty="0"/>
+              <a:t> = 16,250,000 ft</a:t>
+            </a:r>
+            <a:r>
+              <a:rPr lang="en-US" baseline="30000" dirty="0"/>
+              <a:t>2</a:t>
+            </a:r>
+            <a:r>
+              <a:rPr lang="en-US" dirty="0"/>
+              <a:t> </a:t>
+            </a:r>
+          </a:p>
+          <a:p>
+            <a:pPr lvl="1"/>
+            <a:r>
+              <a:rPr lang="en-US" dirty="0"/>
+              <a:t>A</a:t>
+            </a:r>
+            <a:r>
+              <a:rPr lang="en-US" baseline="-25000" dirty="0"/>
+              <a:t>land</a:t>
+            </a:r>
+            <a:r>
+              <a:rPr lang="en-US" dirty="0"/>
+              <a:t> = </a:t>
+            </a:r>
+            <a:r>
+              <a:rPr lang="en-US" dirty="0" err="1"/>
+              <a:t>A</a:t>
+            </a:r>
+            <a:r>
+              <a:rPr lang="en-US" baseline="-25000" dirty="0" err="1"/>
+              <a:t>total</a:t>
+            </a:r>
+            <a:r>
+              <a:rPr lang="en-US" dirty="0"/>
+              <a:t> – A</a:t>
+            </a:r>
+            <a:r>
+              <a:rPr lang="en-US" baseline="-25000" dirty="0"/>
+              <a:t>lake</a:t>
+            </a:r>
+            <a:r>
+              <a:rPr lang="en-US" dirty="0"/>
+              <a:t> = 233,750,000 ft</a:t>
+            </a:r>
+            <a:r>
+              <a:rPr lang="en-US" baseline="30000" dirty="0"/>
+              <a:t>2</a:t>
+            </a:r>
+            <a:r>
+              <a:rPr lang="en-US" dirty="0"/>
+              <a:t> </a:t>
+            </a:r>
+          </a:p>
+        </p:txBody>
+      </p:sp>
+      <p:pic>
+        <p:nvPicPr>
+          <p:cNvPr id="4" name="Picture 3">
+            <a:extLst>
+              <a:ext uri="{FF2B5EF4-FFF2-40B4-BE49-F238E27FC236}">
+                <a16:creationId xmlns:a16="http://schemas.microsoft.com/office/drawing/2014/main" id="{F89DF20D-F996-F573-8CB0-406F8FDADC38}"/>
+              </a:ext>
+            </a:extLst>
+          </p:cNvPr>
+          <p:cNvPicPr>
+            <a:picLocks noChangeAspect="1"/>
+          </p:cNvPicPr>
+          <p:nvPr/>
+        </p:nvPicPr>
+        <p:blipFill rotWithShape="1">
+          <a:blip r:embed="rId2" cstate="print">
+            <a:extLst>
+              <a:ext uri="{28A0092B-C50C-407E-A947-70E740481C1C}">
+                <a14:useLocalDpi xmlns:a14="http://schemas.microsoft.com/office/drawing/2010/main" val="0"/>
+              </a:ext>
+            </a:extLst>
+          </a:blip>
+          <a:srcRect l="21235" t="10064" r="22625" b="26593"/>
+          <a:stretch/>
+        </p:blipFill>
+        <p:spPr>
+          <a:xfrm rot="-60000">
+            <a:off x="9801379" y="162860"/>
+            <a:ext cx="2225328" cy="3256313"/>
+          </a:xfrm>
+          <a:prstGeom prst="rect">
+            <a:avLst/>
+          </a:prstGeom>
+        </p:spPr>
+      </p:pic>
+    </p:spTree>
+    <p:extLst>
+      <p:ext uri="{BB962C8B-B14F-4D97-AF65-F5344CB8AC3E}">
+        <p14:creationId xmlns:p14="http://schemas.microsoft.com/office/powerpoint/2010/main" val="2131344599"/>
+      </p:ext>
+    </p:extLst>
+  </p:cSld>
+  <p:clrMapOvr>
+    <a:masterClrMapping/>
+  </p:clrMapOvr>
+</p:sld>
+</file>
+
+<file path=ppt/slides/slide15.xml><?xml version="1.0" encoding="utf-8"?>
+<p:sld xmlns:a="http://schemas.openxmlformats.org/drawingml/2006/main" xmlns:r="http://schemas.openxmlformats.org/officeDocument/2006/relationships" xmlns:p="http://schemas.openxmlformats.org/presentationml/2006/main">
+  <p:cSld>
+    <p:spTree>
+      <p:nvGrpSpPr>
+        <p:cNvPr id="1" name=""/>
+        <p:cNvGrpSpPr/>
+        <p:nvPr/>
+      </p:nvGrpSpPr>
+      <p:grpSpPr>
+        <a:xfrm>
+          <a:off x="0" y="0"/>
+          <a:ext cx="0" cy="0"/>
+          <a:chOff x="0" y="0"/>
+          <a:chExt cx="0" cy="0"/>
+        </a:xfrm>
+      </p:grpSpPr>
+      <p:sp>
+        <p:nvSpPr>
+          <p:cNvPr id="2" name="Title 1">
+            <a:extLst>
+              <a:ext uri="{FF2B5EF4-FFF2-40B4-BE49-F238E27FC236}">
+                <a16:creationId xmlns:a16="http://schemas.microsoft.com/office/drawing/2014/main" id="{6EFA02C5-6826-BA69-6102-8C926635E2A9}"/>
+              </a:ext>
+            </a:extLst>
+          </p:cNvPr>
+          <p:cNvSpPr>
+            <a:spLocks noGrp="1"/>
+          </p:cNvSpPr>
+          <p:nvPr>
+            <p:ph type="title"/>
+          </p:nvPr>
+        </p:nvSpPr>
+        <p:spPr/>
+        <p:txBody>
+          <a:bodyPr/>
+          <a:lstStyle/>
+          <a:p>
+            <a:r>
+              <a:rPr lang="en-US" dirty="0"/>
+              <a:t>Phase 1 – Planning Phase</a:t>
+            </a:r>
+          </a:p>
+        </p:txBody>
+      </p:sp>
+      <p:sp>
+        <p:nvSpPr>
+          <p:cNvPr id="3" name="Content Placeholder 2">
+            <a:extLst>
+              <a:ext uri="{FF2B5EF4-FFF2-40B4-BE49-F238E27FC236}">
+                <a16:creationId xmlns:a16="http://schemas.microsoft.com/office/drawing/2014/main" id="{6874B491-DBE8-FB12-10E6-A09E4683949C}"/>
+              </a:ext>
+            </a:extLst>
+          </p:cNvPr>
+          <p:cNvSpPr>
+            <a:spLocks noGrp="1"/>
+          </p:cNvSpPr>
+          <p:nvPr>
+            <p:ph idx="1"/>
+          </p:nvPr>
+        </p:nvSpPr>
+        <p:spPr/>
+        <p:txBody>
+          <a:bodyPr/>
+          <a:lstStyle/>
+          <a:p>
+            <a:r>
+              <a:rPr lang="en-US" dirty="0"/>
+              <a:t>Calculated evapotranspiration rates</a:t>
+            </a:r>
+          </a:p>
+          <a:p>
+            <a:pPr lvl="1"/>
+            <a:r>
+              <a:rPr lang="en-US" dirty="0" err="1"/>
+              <a:t>ET</a:t>
+            </a:r>
+            <a:r>
+              <a:rPr lang="en-US" baseline="-25000" dirty="0" err="1"/>
+              <a:t>land</a:t>
+            </a:r>
+            <a:r>
+              <a:rPr lang="en-US" dirty="0"/>
+              <a:t> = ( 0.0021 A</a:t>
+            </a:r>
+            <a:r>
+              <a:rPr lang="en-US" baseline="-25000" dirty="0"/>
+              <a:t>lake</a:t>
+            </a:r>
+            <a:r>
+              <a:rPr lang="en-US" dirty="0"/>
+              <a:t> + 0.0082 A</a:t>
+            </a:r>
+            <a:r>
+              <a:rPr lang="en-US" baseline="-25000" dirty="0"/>
+              <a:t>land</a:t>
+            </a:r>
+            <a:r>
+              <a:rPr lang="en-US" dirty="0"/>
+              <a:t> – 888,494 ) / A</a:t>
+            </a:r>
+            <a:r>
+              <a:rPr lang="en-US" baseline="-25000" dirty="0"/>
+              <a:t>land</a:t>
+            </a:r>
+          </a:p>
+          <a:p>
+            <a:pPr lvl="1"/>
+            <a:r>
+              <a:rPr lang="en-US" dirty="0" err="1"/>
+              <a:t>ET</a:t>
+            </a:r>
+            <a:r>
+              <a:rPr lang="en-US" baseline="-25000" dirty="0" err="1"/>
+              <a:t>land</a:t>
+            </a:r>
+            <a:r>
+              <a:rPr lang="en-US" dirty="0"/>
+              <a:t> = ( 34,125 + 1,916,750 – 888,494 ) / 233,750,000</a:t>
+            </a:r>
+          </a:p>
+          <a:p>
+            <a:pPr lvl="1"/>
+            <a:r>
+              <a:rPr lang="en-US" dirty="0" err="1"/>
+              <a:t>ET</a:t>
+            </a:r>
+            <a:r>
+              <a:rPr lang="en-US" baseline="-25000" dirty="0" err="1"/>
+              <a:t>land</a:t>
+            </a:r>
+            <a:r>
+              <a:rPr lang="en-US" dirty="0"/>
+              <a:t> = 1,062,381 / 233,750,000 = 0.0045 ft/d = 19.921 in/</a:t>
+            </a:r>
+            <a:r>
+              <a:rPr lang="en-US" dirty="0" err="1"/>
+              <a:t>yr</a:t>
+            </a:r>
+            <a:endParaRPr lang="en-US" dirty="0"/>
+          </a:p>
+          <a:p>
+            <a:r>
+              <a:rPr lang="en-US" dirty="0"/>
+              <a:t>Calculated net groundwater recharge rates</a:t>
+            </a:r>
+          </a:p>
+          <a:p>
+            <a:pPr lvl="1"/>
+            <a:r>
+              <a:rPr lang="en-US" dirty="0" err="1"/>
+              <a:t>I</a:t>
+            </a:r>
+            <a:r>
+              <a:rPr lang="en-US" baseline="-25000" dirty="0" err="1"/>
+              <a:t>land</a:t>
+            </a:r>
+            <a:r>
+              <a:rPr lang="en-US" dirty="0"/>
+              <a:t> = (0.0082 – 0.0045) = 0.0037 ft/day = 16.217 in/</a:t>
+            </a:r>
+            <a:r>
+              <a:rPr lang="en-US" dirty="0" err="1"/>
+              <a:t>yr</a:t>
+            </a:r>
+            <a:endParaRPr lang="en-US" dirty="0"/>
+          </a:p>
+          <a:p>
+            <a:r>
+              <a:rPr lang="en-US" dirty="0"/>
+              <a:t>Calculated evapotranspiration/rainfall ratio</a:t>
+            </a:r>
+          </a:p>
+          <a:p>
+            <a:pPr lvl="1"/>
+            <a:r>
+              <a:rPr lang="en-US" dirty="0" err="1"/>
+              <a:t>ET</a:t>
+            </a:r>
+            <a:r>
+              <a:rPr lang="en-US" baseline="-25000" dirty="0" err="1"/>
+              <a:t>land</a:t>
+            </a:r>
+            <a:r>
+              <a:rPr lang="en-US" dirty="0"/>
+              <a:t> / </a:t>
+            </a:r>
+            <a:r>
+              <a:rPr lang="en-US" dirty="0" err="1"/>
+              <a:t>R</a:t>
+            </a:r>
+            <a:r>
+              <a:rPr lang="en-US" baseline="-25000" dirty="0" err="1"/>
+              <a:t>land</a:t>
+            </a:r>
+            <a:r>
+              <a:rPr lang="en-US" dirty="0"/>
+              <a:t> = 0.0045 / 0.0082 = 54.88 %</a:t>
+            </a:r>
+          </a:p>
+          <a:p>
+            <a:pPr lvl="1"/>
+            <a:r>
+              <a:rPr lang="en-US" dirty="0" err="1"/>
+              <a:t>Elake</a:t>
+            </a:r>
+            <a:r>
+              <a:rPr lang="en-US" dirty="0"/>
+              <a:t> / </a:t>
+            </a:r>
+            <a:r>
+              <a:rPr lang="en-US" dirty="0" err="1"/>
+              <a:t>Rlake</a:t>
+            </a:r>
+            <a:r>
+              <a:rPr lang="en-US" dirty="0"/>
+              <a:t> = 0.0062 / 0.0082 = 75.12 %</a:t>
+            </a:r>
+          </a:p>
+          <a:p>
+            <a:endParaRPr lang="en-US" dirty="0"/>
+          </a:p>
+        </p:txBody>
+      </p:sp>
+      <p:pic>
+        <p:nvPicPr>
+          <p:cNvPr id="4" name="Picture 3">
+            <a:extLst>
+              <a:ext uri="{FF2B5EF4-FFF2-40B4-BE49-F238E27FC236}">
+                <a16:creationId xmlns:a16="http://schemas.microsoft.com/office/drawing/2014/main" id="{88499FEA-4228-3134-A6A4-6E4C9566F329}"/>
+              </a:ext>
+            </a:extLst>
+          </p:cNvPr>
+          <p:cNvPicPr>
+            <a:picLocks noChangeAspect="1"/>
+          </p:cNvPicPr>
+          <p:nvPr/>
+        </p:nvPicPr>
+        <p:blipFill rotWithShape="1">
+          <a:blip r:embed="rId2" cstate="print">
+            <a:extLst>
+              <a:ext uri="{28A0092B-C50C-407E-A947-70E740481C1C}">
+                <a14:useLocalDpi xmlns:a14="http://schemas.microsoft.com/office/drawing/2010/main" val="0"/>
+              </a:ext>
+            </a:extLst>
+          </a:blip>
+          <a:srcRect l="21235" t="10064" r="22625" b="26593"/>
+          <a:stretch/>
+        </p:blipFill>
+        <p:spPr>
+          <a:xfrm rot="-60000">
+            <a:off x="9801379" y="162860"/>
+            <a:ext cx="2225328" cy="3256313"/>
+          </a:xfrm>
+          <a:prstGeom prst="rect">
+            <a:avLst/>
+          </a:prstGeom>
+        </p:spPr>
+      </p:pic>
+    </p:spTree>
+    <p:extLst>
+      <p:ext uri="{BB962C8B-B14F-4D97-AF65-F5344CB8AC3E}">
+        <p14:creationId xmlns:p14="http://schemas.microsoft.com/office/powerpoint/2010/main" val="205598678"/>
+      </p:ext>
+    </p:extLst>
+  </p:cSld>
+  <p:clrMapOvr>
+    <a:masterClrMapping/>
+  </p:clrMapOvr>
+</p:sld>
+</file>
+
+<file path=ppt/slides/slide16.xml><?xml version="1.0" encoding="utf-8"?>
 <p:sld xmlns:a="http://schemas.openxmlformats.org/drawingml/2006/main" xmlns:r="http://schemas.openxmlformats.org/officeDocument/2006/relationships" xmlns:p="http://schemas.openxmlformats.org/presentationml/2006/main">
   <p:cSld>
     <p:spTree>
@@ -22570,7 +23568,7 @@
         <a:effectLst/>
         <a:extLst>
           <a:ext uri="{AF507438-7753-43e0-B8FC-AC1667EBCBE1}">
-            <a14:hiddenEffects xmlns="" xmlns:a14="http://schemas.microsoft.com/office/drawing/2010/main">
+            <a14:hiddenEffects xmlns:a14="http://schemas.microsoft.com/office/drawing/2010/main" xmlns="">
               <a:effectLst>
                 <a:outerShdw blurRad="63500" dist="38099" dir="2700000" algn="ctr" rotWithShape="0">
                   <a:schemeClr val="bg2">
@@ -22646,7 +23644,7 @@
         <a:effectLst/>
         <a:extLst>
           <a:ext uri="{AF507438-7753-43e0-B8FC-AC1667EBCBE1}">
-            <a14:hiddenEffects xmlns="" xmlns:a14="http://schemas.microsoft.com/office/drawing/2010/main">
+            <a14:hiddenEffects xmlns:a14="http://schemas.microsoft.com/office/drawing/2010/main" xmlns="">
               <a:effectLst>
                 <a:outerShdw blurRad="63500" dist="38099" dir="2700000" algn="ctr" rotWithShape="0">
                   <a:schemeClr val="bg2">

</xml_diff>

<commit_message>
Add advanced package example
</commit_message>
<xml_diff>
--- a/Lectures/Day3_4lecture_McDonaldValley_Stage1.pptx
+++ b/Lectures/Day3_4lecture_McDonaldValley_Stage1.pptx
@@ -2604,14 +2604,14 @@
           <a:effectLst/>
           <a:extLst>
             <a:ext uri="{909E8E84-426E-40dd-AFC4-6F175D3DCCD1}">
-              <a14:hiddenFill xmlns="" xmlns:a14="http://schemas.microsoft.com/office/drawing/2010/main">
+              <a14:hiddenFill xmlns:a14="http://schemas.microsoft.com/office/drawing/2010/main" xmlns="">
                 <a:solidFill>
                   <a:schemeClr val="accent1"/>
                 </a:solidFill>
               </a14:hiddenFill>
             </a:ext>
             <a:ext uri="{91240B29-F687-4f45-9708-019B960494DF}">
-              <a14:hiddenLine xmlns="" xmlns:a14="http://schemas.microsoft.com/office/drawing/2010/main" w="12700">
+              <a14:hiddenLine xmlns:a14="http://schemas.microsoft.com/office/drawing/2010/main" xmlns="" w="12700">
                 <a:solidFill>
                   <a:schemeClr val="tx1"/>
                 </a:solidFill>
@@ -2621,7 +2621,7 @@
               </a14:hiddenLine>
             </a:ext>
             <a:ext uri="{AF507438-7753-43e0-B8FC-AC1667EBCBE1}">
-              <a14:hiddenEffects xmlns="" xmlns:a14="http://schemas.microsoft.com/office/drawing/2010/main">
+              <a14:hiddenEffects xmlns:a14="http://schemas.microsoft.com/office/drawing/2010/main" xmlns="">
                 <a:effectLst>
                   <a:outerShdw blurRad="63500" dist="38099" dir="2700000" algn="ctr" rotWithShape="0">
                     <a:schemeClr val="bg2">
@@ -2632,7 +2632,7 @@
               </a14:hiddenEffects>
             </a:ext>
             <a:ext uri="{FAA26D3D-D897-4be2-8F04-BA451C77F1D7}">
-              <ma14:placeholderFlag xmlns="" xmlns:ma14="http://schemas.microsoft.com/office/mac/drawingml/2011/main" val="1"/>
+              <ma14:placeholderFlag xmlns:ma14="http://schemas.microsoft.com/office/mac/drawingml/2011/main" xmlns="" val="1"/>
             </a:ext>
           </a:extLst>
         </p:spPr>
@@ -2710,12 +2710,12 @@
           <a:effectLst/>
           <a:extLst>
             <a:ext uri="{909E8E84-426E-40dd-AFC4-6F175D3DCCD1}">
-              <a14:hiddenFill xmlns="" xmlns:a14="http://schemas.microsoft.com/office/drawing/2010/main">
+              <a14:hiddenFill xmlns:a14="http://schemas.microsoft.com/office/drawing/2010/main" xmlns="">
                 <a:noFill/>
               </a14:hiddenFill>
             </a:ext>
             <a:ext uri="{AF507438-7753-43e0-B8FC-AC1667EBCBE1}">
-              <a14:hiddenEffects xmlns="" xmlns:a14="http://schemas.microsoft.com/office/drawing/2010/main">
+              <a14:hiddenEffects xmlns:a14="http://schemas.microsoft.com/office/drawing/2010/main" xmlns="">
                 <a:effectLst>
                   <a:outerShdw blurRad="63500" dist="38099" dir="2700000" algn="ctr" rotWithShape="0">
                     <a:srgbClr val="000000">
@@ -2726,7 +2726,7 @@
               </a14:hiddenEffects>
             </a:ext>
             <a:ext uri="{53640926-AAD7-44d8-BBD7-CCE9431645EC}">
-              <a14:shadowObscured xmlns="" xmlns:a14="http://schemas.microsoft.com/office/drawing/2010/main" val="1"/>
+              <a14:shadowObscured xmlns:a14="http://schemas.microsoft.com/office/drawing/2010/main" xmlns="" val="1"/>
             </a:ext>
           </a:extLst>
         </p:spPr>
@@ -2904,14 +2904,14 @@
           <a:effectLst/>
           <a:extLst>
             <a:ext uri="{909E8E84-426E-40dd-AFC4-6F175D3DCCD1}">
-              <a14:hiddenFill xmlns:a14="http://schemas.microsoft.com/office/drawing/2010/main" xmlns="">
+              <a14:hiddenFill xmlns="" xmlns:a14="http://schemas.microsoft.com/office/drawing/2010/main">
                 <a:solidFill>
                   <a:schemeClr val="accent1"/>
                 </a:solidFill>
               </a14:hiddenFill>
             </a:ext>
             <a:ext uri="{91240B29-F687-4f45-9708-019B960494DF}">
-              <a14:hiddenLine xmlns:a14="http://schemas.microsoft.com/office/drawing/2010/main" xmlns="" w="12700">
+              <a14:hiddenLine xmlns="" xmlns:a14="http://schemas.microsoft.com/office/drawing/2010/main" w="12700">
                 <a:solidFill>
                   <a:schemeClr val="tx1"/>
                 </a:solidFill>
@@ -2921,7 +2921,7 @@
               </a14:hiddenLine>
             </a:ext>
             <a:ext uri="{AF507438-7753-43e0-B8FC-AC1667EBCBE1}">
-              <a14:hiddenEffects xmlns:a14="http://schemas.microsoft.com/office/drawing/2010/main" xmlns="">
+              <a14:hiddenEffects xmlns="" xmlns:a14="http://schemas.microsoft.com/office/drawing/2010/main">
                 <a:effectLst>
                   <a:outerShdw blurRad="63500" dist="38099" dir="2700000" algn="ctr" rotWithShape="0">
                     <a:schemeClr val="bg2">
@@ -3076,14 +3076,14 @@
           </a:ln>
           <a:extLst>
             <a:ext uri="{909E8E84-426E-40dd-AFC4-6F175D3DCCD1}">
-              <a14:hiddenFill xmlns:a14="http://schemas.microsoft.com/office/drawing/2010/main" xmlns="">
+              <a14:hiddenFill xmlns="" xmlns:a14="http://schemas.microsoft.com/office/drawing/2010/main">
                 <a:solidFill>
                   <a:srgbClr val="FFFFFF"/>
                 </a:solidFill>
               </a14:hiddenFill>
             </a:ext>
             <a:ext uri="{91240B29-F687-4f45-9708-019B960494DF}">
-              <a14:hiddenLine xmlns:a14="http://schemas.microsoft.com/office/drawing/2010/main" xmlns="" w="9525">
+              <a14:hiddenLine xmlns="" xmlns:a14="http://schemas.microsoft.com/office/drawing/2010/main" w="9525">
                 <a:solidFill>
                   <a:srgbClr val="000000"/>
                 </a:solidFill>
@@ -4662,14 +4662,14 @@
           <a:effectLst/>
           <a:extLst>
             <a:ext uri="{909E8E84-426E-40dd-AFC4-6F175D3DCCD1}">
-              <a14:hiddenFill xmlns:a14="http://schemas.microsoft.com/office/drawing/2010/main" xmlns="">
+              <a14:hiddenFill xmlns="" xmlns:a14="http://schemas.microsoft.com/office/drawing/2010/main">
                 <a:solidFill>
                   <a:schemeClr val="accent1"/>
                 </a:solidFill>
               </a14:hiddenFill>
             </a:ext>
             <a:ext uri="{91240B29-F687-4f45-9708-019B960494DF}">
-              <a14:hiddenLine xmlns:a14="http://schemas.microsoft.com/office/drawing/2010/main" xmlns="" w="12700">
+              <a14:hiddenLine xmlns="" xmlns:a14="http://schemas.microsoft.com/office/drawing/2010/main" w="12700">
                 <a:solidFill>
                   <a:schemeClr val="tx1"/>
                 </a:solidFill>
@@ -4679,7 +4679,7 @@
               </a14:hiddenLine>
             </a:ext>
             <a:ext uri="{AF507438-7753-43e0-B8FC-AC1667EBCBE1}">
-              <a14:hiddenEffects xmlns:a14="http://schemas.microsoft.com/office/drawing/2010/main" xmlns="">
+              <a14:hiddenEffects xmlns="" xmlns:a14="http://schemas.microsoft.com/office/drawing/2010/main">
                 <a:effectLst>
                   <a:outerShdw blurRad="63500" dist="38099" dir="2700000" algn="ctr" rotWithShape="0">
                     <a:schemeClr val="bg2">
@@ -4690,7 +4690,7 @@
               </a14:hiddenEffects>
             </a:ext>
             <a:ext uri="{FAA26D3D-D897-4be2-8F04-BA451C77F1D7}">
-              <ma14:placeholderFlag xmlns:ma14="http://schemas.microsoft.com/office/mac/drawingml/2011/main" xmlns="" val="1"/>
+              <ma14:placeholderFlag xmlns="" xmlns:ma14="http://schemas.microsoft.com/office/mac/drawingml/2011/main" val="1"/>
             </a:ext>
           </a:extLst>
         </p:spPr>
@@ -4735,14 +4735,14 @@
           <a:effectLst/>
           <a:extLst>
             <a:ext uri="{909E8E84-426E-40dd-AFC4-6F175D3DCCD1}">
-              <a14:hiddenFill xmlns:a14="http://schemas.microsoft.com/office/drawing/2010/main" xmlns="">
+              <a14:hiddenFill xmlns="" xmlns:a14="http://schemas.microsoft.com/office/drawing/2010/main">
                 <a:solidFill>
                   <a:schemeClr val="accent1"/>
                 </a:solidFill>
               </a14:hiddenFill>
             </a:ext>
             <a:ext uri="{91240B29-F687-4f45-9708-019B960494DF}">
-              <a14:hiddenLine xmlns:a14="http://schemas.microsoft.com/office/drawing/2010/main" xmlns="" w="12700">
+              <a14:hiddenLine xmlns="" xmlns:a14="http://schemas.microsoft.com/office/drawing/2010/main" w="12700">
                 <a:solidFill>
                   <a:schemeClr val="tx1"/>
                 </a:solidFill>
@@ -4752,7 +4752,7 @@
               </a14:hiddenLine>
             </a:ext>
             <a:ext uri="{AF507438-7753-43e0-B8FC-AC1667EBCBE1}">
-              <a14:hiddenEffects xmlns:a14="http://schemas.microsoft.com/office/drawing/2010/main" xmlns="">
+              <a14:hiddenEffects xmlns="" xmlns:a14="http://schemas.microsoft.com/office/drawing/2010/main">
                 <a:effectLst>
                   <a:outerShdw blurRad="63500" dist="38099" dir="2700000" algn="ctr" rotWithShape="0">
                     <a:schemeClr val="bg2">
@@ -4763,7 +4763,7 @@
               </a14:hiddenEffects>
             </a:ext>
             <a:ext uri="{FAA26D3D-D897-4be2-8F04-BA451C77F1D7}">
-              <ma14:placeholderFlag xmlns:ma14="http://schemas.microsoft.com/office/mac/drawingml/2011/main" xmlns="" val="1"/>
+              <ma14:placeholderFlag xmlns="" xmlns:ma14="http://schemas.microsoft.com/office/mac/drawingml/2011/main" val="1"/>
             </a:ext>
           </a:extLst>
         </p:spPr>
@@ -4853,14 +4853,14 @@
           </a:ln>
           <a:extLst>
             <a:ext uri="{909E8E84-426E-40dd-AFC4-6F175D3DCCD1}">
-              <a14:hiddenFill xmlns:a14="http://schemas.microsoft.com/office/drawing/2010/main" xmlns="">
+              <a14:hiddenFill xmlns="" xmlns:a14="http://schemas.microsoft.com/office/drawing/2010/main">
                 <a:solidFill>
                   <a:srgbClr val="FFFFFF"/>
                 </a:solidFill>
               </a14:hiddenFill>
             </a:ext>
             <a:ext uri="{91240B29-F687-4f45-9708-019B960494DF}">
-              <a14:hiddenLine xmlns:a14="http://schemas.microsoft.com/office/drawing/2010/main" xmlns="" w="9525">
+              <a14:hiddenLine xmlns="" xmlns:a14="http://schemas.microsoft.com/office/drawing/2010/main" w="9525">
                 <a:solidFill>
                   <a:srgbClr val="000000"/>
                 </a:solidFill>
@@ -9736,7 +9736,7 @@
           <a:p>
             <a:r>
               <a:rPr lang="en-US" dirty="0"/>
-              <a:t>Calculated net groundwater recharge rates</a:t>
+              <a:t>Calculated net recharge rates</a:t>
             </a:r>
           </a:p>
           <a:p>
@@ -9752,6 +9752,26 @@
             <a:r>
               <a:rPr lang="en-US" dirty="0"/>
               <a:t> = (0.0082 – 0.0045) = 0.0037 ft/day = 16.217 in/</a:t>
+            </a:r>
+            <a:r>
+              <a:rPr lang="en-US" dirty="0" err="1"/>
+              <a:t>yr</a:t>
+            </a:r>
+            <a:endParaRPr lang="en-US" dirty="0"/>
+          </a:p>
+          <a:p>
+            <a:pPr lvl="1"/>
+            <a:r>
+              <a:rPr lang="en-US" dirty="0" err="1"/>
+              <a:t>I</a:t>
+            </a:r>
+            <a:r>
+              <a:rPr lang="en-US" baseline="-25000" dirty="0" err="1"/>
+              <a:t>lake</a:t>
+            </a:r>
+            <a:r>
+              <a:rPr lang="en-US" dirty="0"/>
+              <a:t> = 0.0021 ft/day = 9 in/</a:t>
             </a:r>
             <a:r>
               <a:rPr lang="en-US" dirty="0" err="1"/>
@@ -23568,7 +23588,7 @@
         <a:effectLst/>
         <a:extLst>
           <a:ext uri="{AF507438-7753-43e0-B8FC-AC1667EBCBE1}">
-            <a14:hiddenEffects xmlns:a14="http://schemas.microsoft.com/office/drawing/2010/main" xmlns="">
+            <a14:hiddenEffects xmlns="" xmlns:a14="http://schemas.microsoft.com/office/drawing/2010/main">
               <a:effectLst>
                 <a:outerShdw blurRad="63500" dist="38099" dir="2700000" algn="ctr" rotWithShape="0">
                   <a:schemeClr val="bg2">
@@ -23644,7 +23664,7 @@
         <a:effectLst/>
         <a:extLst>
           <a:ext uri="{AF507438-7753-43e0-B8FC-AC1667EBCBE1}">
-            <a14:hiddenEffects xmlns:a14="http://schemas.microsoft.com/office/drawing/2010/main" xmlns="">
+            <a14:hiddenEffects xmlns="" xmlns:a14="http://schemas.microsoft.com/office/drawing/2010/main">
               <a:effectLst>
                 <a:outerShdw blurRad="63500" dist="38099" dir="2700000" algn="ctr" rotWithShape="0">
                   <a:schemeClr val="bg2">

</xml_diff>